<commit_message>
Revised version of prep pitch by Franck
I revised my first version.
</commit_message>
<xml_diff>
--- a/Prep Pitch.pptx
+++ b/Prep Pitch.pptx
@@ -6,15 +6,14 @@
   </p:sldMasterIdLst>
   <p:sldIdLst>
     <p:sldId id="256" r:id="rId2"/>
-    <p:sldId id="257" r:id="rId3"/>
-    <p:sldId id="258" r:id="rId4"/>
-    <p:sldId id="259" r:id="rId5"/>
-    <p:sldId id="265" r:id="rId6"/>
-    <p:sldId id="266" r:id="rId7"/>
-    <p:sldId id="267" r:id="rId8"/>
-    <p:sldId id="268" r:id="rId9"/>
-    <p:sldId id="260" r:id="rId10"/>
-    <p:sldId id="261" r:id="rId11"/>
+    <p:sldId id="258" r:id="rId3"/>
+    <p:sldId id="259" r:id="rId4"/>
+    <p:sldId id="265" r:id="rId5"/>
+    <p:sldId id="266" r:id="rId6"/>
+    <p:sldId id="267" r:id="rId7"/>
+    <p:sldId id="268" r:id="rId8"/>
+    <p:sldId id="260" r:id="rId9"/>
+    <p:sldId id="261" r:id="rId10"/>
   </p:sldIdLst>
   <p:sldSz cx="12192000" cy="6858000"/>
   <p:notesSz cx="6858000" cy="9144000"/>
@@ -347,7 +346,7 @@
           <a:p>
             <a:fld id="{BDC17371-CEE8-4D9D-A3B4-7F3B423FB76A}" type="datetimeFigureOut">
               <a:rPr lang="en-US" smtClean="0"/>
-              <a:t>10/2/2019</a:t>
+              <a:t>10/3/2019</a:t>
             </a:fld>
             <a:endParaRPr lang="en-US"/>
           </a:p>
@@ -555,7 +554,7 @@
           <a:p>
             <a:fld id="{BDC17371-CEE8-4D9D-A3B4-7F3B423FB76A}" type="datetimeFigureOut">
               <a:rPr lang="en-US" smtClean="0"/>
-              <a:t>10/2/2019</a:t>
+              <a:t>10/3/2019</a:t>
             </a:fld>
             <a:endParaRPr lang="en-US"/>
           </a:p>
@@ -811,7 +810,7 @@
           <a:p>
             <a:fld id="{BDC17371-CEE8-4D9D-A3B4-7F3B423FB76A}" type="datetimeFigureOut">
               <a:rPr lang="en-US" smtClean="0"/>
-              <a:t>10/2/2019</a:t>
+              <a:t>10/3/2019</a:t>
             </a:fld>
             <a:endParaRPr lang="en-US"/>
           </a:p>
@@ -985,7 +984,7 @@
           <a:p>
             <a:fld id="{BDC17371-CEE8-4D9D-A3B4-7F3B423FB76A}" type="datetimeFigureOut">
               <a:rPr lang="en-US" smtClean="0"/>
-              <a:t>10/2/2019</a:t>
+              <a:t>10/3/2019</a:t>
             </a:fld>
             <a:endParaRPr lang="en-US"/>
           </a:p>
@@ -1328,7 +1327,7 @@
           <a:p>
             <a:fld id="{BDC17371-CEE8-4D9D-A3B4-7F3B423FB76A}" type="datetimeFigureOut">
               <a:rPr lang="en-US" smtClean="0"/>
-              <a:t>10/2/2019</a:t>
+              <a:t>10/3/2019</a:t>
             </a:fld>
             <a:endParaRPr lang="en-US"/>
           </a:p>
@@ -1603,7 +1602,7 @@
           <a:p>
             <a:fld id="{BDC17371-CEE8-4D9D-A3B4-7F3B423FB76A}" type="datetimeFigureOut">
               <a:rPr lang="en-US" smtClean="0"/>
-              <a:t>10/2/2019</a:t>
+              <a:t>10/3/2019</a:t>
             </a:fld>
             <a:endParaRPr lang="en-US"/>
           </a:p>
@@ -1982,7 +1981,7 @@
           <a:p>
             <a:fld id="{BDC17371-CEE8-4D9D-A3B4-7F3B423FB76A}" type="datetimeFigureOut">
               <a:rPr lang="en-US" smtClean="0"/>
-              <a:t>10/2/2019</a:t>
+              <a:t>10/3/2019</a:t>
             </a:fld>
             <a:endParaRPr lang="en-US"/>
           </a:p>
@@ -2100,7 +2099,7 @@
           <a:p>
             <a:fld id="{BDC17371-CEE8-4D9D-A3B4-7F3B423FB76A}" type="datetimeFigureOut">
               <a:rPr lang="en-US" smtClean="0"/>
-              <a:t>10/2/2019</a:t>
+              <a:t>10/3/2019</a:t>
             </a:fld>
             <a:endParaRPr lang="en-US"/>
           </a:p>
@@ -2271,7 +2270,7 @@
           <a:p>
             <a:fld id="{BDC17371-CEE8-4D9D-A3B4-7F3B423FB76A}" type="datetimeFigureOut">
               <a:rPr lang="en-US" smtClean="0"/>
-              <a:t>10/2/2019</a:t>
+              <a:t>10/3/2019</a:t>
             </a:fld>
             <a:endParaRPr lang="en-US"/>
           </a:p>
@@ -2625,7 +2624,7 @@
           <a:p>
             <a:fld id="{BDC17371-CEE8-4D9D-A3B4-7F3B423FB76A}" type="datetimeFigureOut">
               <a:rPr lang="en-US" smtClean="0"/>
-              <a:t>10/2/2019</a:t>
+              <a:t>10/3/2019</a:t>
             </a:fld>
             <a:endParaRPr lang="en-US"/>
           </a:p>
@@ -3007,7 +3006,7 @@
           <a:p>
             <a:fld id="{BDC17371-CEE8-4D9D-A3B4-7F3B423FB76A}" type="datetimeFigureOut">
               <a:rPr lang="en-US" smtClean="0"/>
-              <a:t>10/2/2019</a:t>
+              <a:t>10/3/2019</a:t>
             </a:fld>
             <a:endParaRPr lang="en-US"/>
           </a:p>
@@ -3294,7 +3293,7 @@
           <a:p>
             <a:fld id="{BDC17371-CEE8-4D9D-A3B4-7F3B423FB76A}" type="datetimeFigureOut">
               <a:rPr lang="en-US" smtClean="0"/>
-              <a:t>10/2/2019</a:t>
+              <a:t>10/3/2019</a:t>
             </a:fld>
             <a:endParaRPr lang="en-US"/>
           </a:p>
@@ -3887,89 +3886,6 @@
 </p:sld>
 </file>
 
-<file path=ppt/slides/slide10.xml><?xml version="1.0" encoding="utf-8"?>
-<p:sld xmlns:a="http://schemas.openxmlformats.org/drawingml/2006/main" xmlns:r="http://schemas.openxmlformats.org/officeDocument/2006/relationships" xmlns:p="http://schemas.openxmlformats.org/presentationml/2006/main">
-  <p:cSld>
-    <p:spTree>
-      <p:nvGrpSpPr>
-        <p:cNvPr id="1" name=""/>
-        <p:cNvGrpSpPr/>
-        <p:nvPr/>
-      </p:nvGrpSpPr>
-      <p:grpSpPr>
-        <a:xfrm>
-          <a:off x="0" y="0"/>
-          <a:ext cx="0" cy="0"/>
-          <a:chOff x="0" y="0"/>
-          <a:chExt cx="0" cy="0"/>
-        </a:xfrm>
-      </p:grpSpPr>
-      <p:sp>
-        <p:nvSpPr>
-          <p:cNvPr id="2" name="Titre 1">
-            <a:extLst>
-              <a:ext uri="{FF2B5EF4-FFF2-40B4-BE49-F238E27FC236}">
-                <a16:creationId xmlns:a16="http://schemas.microsoft.com/office/drawing/2014/main" id="{46430754-1CFB-48F0-8057-FA31C9D16A9E}"/>
-              </a:ext>
-            </a:extLst>
-          </p:cNvPr>
-          <p:cNvSpPr>
-            <a:spLocks noGrp="1"/>
-          </p:cNvSpPr>
-          <p:nvPr>
-            <p:ph type="title"/>
-          </p:nvPr>
-        </p:nvSpPr>
-        <p:spPr/>
-        <p:txBody>
-          <a:bodyPr/>
-          <a:lstStyle/>
-          <a:p>
-            <a:r>
-              <a:rPr lang="en-US" dirty="0"/>
-              <a:t>What are our expectations?</a:t>
-            </a:r>
-          </a:p>
-        </p:txBody>
-      </p:sp>
-      <p:sp>
-        <p:nvSpPr>
-          <p:cNvPr id="3" name="Espace réservé du contenu 2">
-            <a:extLst>
-              <a:ext uri="{FF2B5EF4-FFF2-40B4-BE49-F238E27FC236}">
-                <a16:creationId xmlns:a16="http://schemas.microsoft.com/office/drawing/2014/main" id="{2E1EFBB3-4F70-45C5-91CA-432478C5F27E}"/>
-              </a:ext>
-            </a:extLst>
-          </p:cNvPr>
-          <p:cNvSpPr>
-            <a:spLocks noGrp="1"/>
-          </p:cNvSpPr>
-          <p:nvPr>
-            <p:ph idx="1"/>
-          </p:nvPr>
-        </p:nvSpPr>
-        <p:spPr/>
-        <p:txBody>
-          <a:bodyPr/>
-          <a:lstStyle/>
-          <a:p>
-            <a:endParaRPr lang="en-US"/>
-          </a:p>
-        </p:txBody>
-      </p:sp>
-    </p:spTree>
-    <p:extLst>
-      <p:ext uri="{BB962C8B-B14F-4D97-AF65-F5344CB8AC3E}">
-        <p14:creationId xmlns:p14="http://schemas.microsoft.com/office/powerpoint/2010/main" val="2142257506"/>
-      </p:ext>
-    </p:extLst>
-  </p:cSld>
-  <p:clrMapOvr>
-    <a:masterClrMapping/>
-  </p:clrMapOvr>
-</p:sld>
-</file>
-
 <file path=ppt/slides/slide2.xml><?xml version="1.0" encoding="utf-8"?>
 <p:sld xmlns:a="http://schemas.openxmlformats.org/drawingml/2006/main" xmlns:r="http://schemas.openxmlformats.org/officeDocument/2006/relationships" xmlns:p="http://schemas.openxmlformats.org/presentationml/2006/main">
   <p:cSld>
@@ -3992,7 +3908,7 @@
           <p:cNvPr id="2" name="Titre 1">
             <a:extLst>
               <a:ext uri="{FF2B5EF4-FFF2-40B4-BE49-F238E27FC236}">
-                <a16:creationId xmlns:a16="http://schemas.microsoft.com/office/drawing/2014/main" id="{3F7E11D9-B105-4890-A79E-409C1CCCA9C5}"/>
+                <a16:creationId xmlns:a16="http://schemas.microsoft.com/office/drawing/2014/main" id="{95DEDEDB-2350-4430-95BF-D73EB3CEFD83}"/>
               </a:ext>
             </a:extLst>
           </p:cNvPr>
@@ -4010,7 +3926,7 @@
           <a:p>
             <a:r>
               <a:rPr lang="en-US" dirty="0"/>
-              <a:t>What is the project about? </a:t>
+              <a:t>What is the objective of our project?</a:t>
             </a:r>
           </a:p>
         </p:txBody>
@@ -4020,7 +3936,7 @@
           <p:cNvPr id="3" name="Espace réservé du contenu 2">
             <a:extLst>
               <a:ext uri="{FF2B5EF4-FFF2-40B4-BE49-F238E27FC236}">
-                <a16:creationId xmlns:a16="http://schemas.microsoft.com/office/drawing/2014/main" id="{74BFA1DA-4D58-442B-AB37-320BC0D4202A}"/>
+                <a16:creationId xmlns:a16="http://schemas.microsoft.com/office/drawing/2014/main" id="{A8C8E66D-EFA2-4221-BFDF-8E8BD38058C0}"/>
               </a:ext>
             </a:extLst>
           </p:cNvPr>
@@ -4033,12 +3949,65 @@
         </p:nvSpPr>
         <p:spPr/>
         <p:txBody>
-          <a:bodyPr/>
-          <a:lstStyle/>
-          <a:p>
-            <a:r>
-              <a:rPr lang="en-US" dirty="0"/>
-              <a:t>See next slide</a:t>
+          <a:bodyPr>
+            <a:normAutofit/>
+          </a:bodyPr>
+          <a:lstStyle/>
+          <a:p>
+            <a:pPr>
+              <a:buFont typeface="Arial" panose="020B0604020202020204" pitchFamily="34" charset="0"/>
+              <a:buChar char="•"/>
+            </a:pPr>
+            <a:r>
+              <a:rPr lang="en-US" sz="2400" dirty="0"/>
+              <a:t> Experiment on a solution design for the automated answering of course related questions from students</a:t>
+            </a:r>
+          </a:p>
+          <a:p>
+            <a:pPr>
+              <a:buFont typeface="Arial" panose="020B0604020202020204" pitchFamily="34" charset="0"/>
+              <a:buChar char="•"/>
+            </a:pPr>
+            <a:r>
+              <a:rPr lang="en-US" sz="2400" dirty="0"/>
+              <a:t> Support provided to students </a:t>
+            </a:r>
+          </a:p>
+          <a:p>
+            <a:pPr lvl="1">
+              <a:buFont typeface="Arial" panose="020B0604020202020204" pitchFamily="34" charset="0"/>
+              <a:buChar char="•"/>
+            </a:pPr>
+            <a:r>
+              <a:rPr lang="en-US" sz="2000" dirty="0"/>
+              <a:t>without requiring the attention of the teacher</a:t>
+            </a:r>
+          </a:p>
+          <a:p>
+            <a:pPr lvl="1">
+              <a:buFont typeface="Arial" panose="020B0604020202020204" pitchFamily="34" charset="0"/>
+              <a:buChar char="•"/>
+            </a:pPr>
+            <a:r>
+              <a:rPr lang="en-US" sz="2000" dirty="0"/>
+              <a:t>24/7 no time delays (immediate answer)</a:t>
+            </a:r>
+          </a:p>
+          <a:p>
+            <a:pPr lvl="1">
+              <a:buFont typeface="Arial" panose="020B0604020202020204" pitchFamily="34" charset="0"/>
+              <a:buChar char="•"/>
+            </a:pPr>
+            <a:endParaRPr lang="en-US" sz="2000" dirty="0"/>
+          </a:p>
+          <a:p>
+            <a:pPr>
+              <a:buFont typeface="Arial" panose="020B0604020202020204" pitchFamily="34" charset="0"/>
+              <a:buChar char="•"/>
+            </a:pPr>
+            <a:r>
+              <a:rPr lang="en-US" sz="2400" dirty="0"/>
+              <a:t> Proof of concept for further development of automated student support</a:t>
             </a:r>
           </a:p>
         </p:txBody>
@@ -4046,7 +4015,7 @@
     </p:spTree>
     <p:extLst>
       <p:ext uri="{BB962C8B-B14F-4D97-AF65-F5344CB8AC3E}">
-        <p14:creationId xmlns:p14="http://schemas.microsoft.com/office/powerpoint/2010/main" val="2564010113"/>
+        <p14:creationId xmlns:p14="http://schemas.microsoft.com/office/powerpoint/2010/main" val="1183574600"/>
       </p:ext>
     </p:extLst>
   </p:cSld>
@@ -4078,7 +4047,7 @@
           <p:cNvPr id="2" name="Titre 1">
             <a:extLst>
               <a:ext uri="{FF2B5EF4-FFF2-40B4-BE49-F238E27FC236}">
-                <a16:creationId xmlns:a16="http://schemas.microsoft.com/office/drawing/2014/main" id="{95DEDEDB-2350-4430-95BF-D73EB3CEFD83}"/>
+                <a16:creationId xmlns:a16="http://schemas.microsoft.com/office/drawing/2014/main" id="{90C8C8C2-F821-4633-BD31-E3ACE264C5E6}"/>
               </a:ext>
             </a:extLst>
           </p:cNvPr>
@@ -4096,7 +4065,7 @@
           <a:p>
             <a:r>
               <a:rPr lang="en-US" dirty="0"/>
-              <a:t>What is the objective of our project?</a:t>
+              <a:t>Why do we think our project is appropriate?</a:t>
             </a:r>
           </a:p>
         </p:txBody>
@@ -4106,7 +4075,7 @@
           <p:cNvPr id="3" name="Espace réservé du contenu 2">
             <a:extLst>
               <a:ext uri="{FF2B5EF4-FFF2-40B4-BE49-F238E27FC236}">
-                <a16:creationId xmlns:a16="http://schemas.microsoft.com/office/drawing/2014/main" id="{A8C8E66D-EFA2-4221-BFDF-8E8BD38058C0}"/>
+                <a16:creationId xmlns:a16="http://schemas.microsoft.com/office/drawing/2014/main" id="{E4D6A3DD-EB75-43A6-A139-19FEBE74FE3F}"/>
               </a:ext>
             </a:extLst>
           </p:cNvPr>
@@ -4119,9 +4088,7 @@
         </p:nvSpPr>
         <p:spPr/>
         <p:txBody>
-          <a:bodyPr>
-            <a:normAutofit/>
-          </a:bodyPr>
+          <a:bodyPr/>
           <a:lstStyle/>
           <a:p>
             <a:pPr>
@@ -4130,7 +4097,7 @@
             </a:pPr>
             <a:r>
               <a:rPr lang="en-US" sz="2400" dirty="0"/>
-              <a:t> Experiment on a solution design for the automated answering of course related questions from students</a:t>
+              <a:t> Going towards digital transformation of FHNW</a:t>
             </a:r>
           </a:p>
           <a:p>
@@ -4140,7 +4107,7 @@
             </a:pPr>
             <a:r>
               <a:rPr lang="en-US" sz="2400" dirty="0"/>
-              <a:t> Support provided to students </a:t>
+              <a:t> Complexity level justifies the use of Agile</a:t>
             </a:r>
           </a:p>
           <a:p>
@@ -4149,8 +4116,8 @@
               <a:buChar char="•"/>
             </a:pPr>
             <a:r>
-              <a:rPr lang="en-US" sz="2000" dirty="0"/>
-              <a:t>without requiring the attention of the teacher</a:t>
+              <a:rPr lang="en-US" sz="2200" dirty="0"/>
+              <a:t>Two languages</a:t>
             </a:r>
           </a:p>
           <a:p>
@@ -4159,8 +4126,8 @@
               <a:buChar char="•"/>
             </a:pPr>
             <a:r>
-              <a:rPr lang="en-US" sz="2000" dirty="0"/>
-              <a:t>24/7 no time delays (immediate answer)</a:t>
+              <a:rPr lang="en-US" sz="2200" dirty="0"/>
+              <a:t>Need to treat large amounts of Data</a:t>
             </a:r>
           </a:p>
           <a:p>
@@ -4168,24 +4135,48 @@
               <a:buFont typeface="Arial" panose="020B0604020202020204" pitchFamily="34" charset="0"/>
               <a:buChar char="•"/>
             </a:pPr>
-            <a:endParaRPr lang="en-US" sz="2000" dirty="0"/>
+            <a:r>
+              <a:rPr lang="en-US" sz="2200" dirty="0"/>
+              <a:t>Machine learning</a:t>
+            </a:r>
+          </a:p>
+          <a:p>
+            <a:pPr lvl="1">
+              <a:buFont typeface="Arial" panose="020B0604020202020204" pitchFamily="34" charset="0"/>
+              <a:buChar char="•"/>
+            </a:pPr>
+            <a:r>
+              <a:rPr lang="en-US" sz="2200" dirty="0"/>
+              <a:t>Knowledge engineering</a:t>
+            </a:r>
           </a:p>
           <a:p>
             <a:pPr>
               <a:buFont typeface="Arial" panose="020B0604020202020204" pitchFamily="34" charset="0"/>
               <a:buChar char="•"/>
             </a:pPr>
-            <a:r>
-              <a:rPr lang="en-US" sz="2400" dirty="0"/>
-              <a:t> Proof of concept for further development of automated student support</a:t>
-            </a:r>
+            <a:endParaRPr lang="en-US" sz="2400" dirty="0"/>
+          </a:p>
+          <a:p>
+            <a:pPr>
+              <a:buFont typeface="Arial" panose="020B0604020202020204" pitchFamily="34" charset="0"/>
+              <a:buChar char="•"/>
+            </a:pPr>
+            <a:endParaRPr lang="en-US" sz="2400" dirty="0"/>
+          </a:p>
+          <a:p>
+            <a:pPr>
+              <a:buFont typeface="Courier New" panose="02070309020205020404" pitchFamily="49" charset="0"/>
+              <a:buChar char="o"/>
+            </a:pPr>
+            <a:endParaRPr lang="en-US" dirty="0"/>
           </a:p>
         </p:txBody>
       </p:sp>
     </p:spTree>
     <p:extLst>
       <p:ext uri="{BB962C8B-B14F-4D97-AF65-F5344CB8AC3E}">
-        <p14:creationId xmlns:p14="http://schemas.microsoft.com/office/powerpoint/2010/main" val="1183574600"/>
+        <p14:creationId xmlns:p14="http://schemas.microsoft.com/office/powerpoint/2010/main" val="1712342135"/>
       </p:ext>
     </p:extLst>
   </p:cSld>
@@ -4217,7 +4208,7 @@
           <p:cNvPr id="2" name="Titre 1">
             <a:extLst>
               <a:ext uri="{FF2B5EF4-FFF2-40B4-BE49-F238E27FC236}">
-                <a16:creationId xmlns:a16="http://schemas.microsoft.com/office/drawing/2014/main" id="{90C8C8C2-F821-4633-BD31-E3ACE264C5E6}"/>
+                <a16:creationId xmlns:a16="http://schemas.microsoft.com/office/drawing/2014/main" id="{C0E931EB-78B1-4E31-B709-475371A200FC}"/>
               </a:ext>
             </a:extLst>
           </p:cNvPr>
@@ -4235,7 +4226,7 @@
           <a:p>
             <a:r>
               <a:rPr lang="en-US" dirty="0"/>
-              <a:t>Why do we think our project is appropriate?</a:t>
+              <a:t>Is the WHO defined?(Stacey Matrix)</a:t>
             </a:r>
           </a:p>
         </p:txBody>
@@ -4245,7 +4236,7 @@
           <p:cNvPr id="3" name="Espace réservé du contenu 2">
             <a:extLst>
               <a:ext uri="{FF2B5EF4-FFF2-40B4-BE49-F238E27FC236}">
-                <a16:creationId xmlns:a16="http://schemas.microsoft.com/office/drawing/2014/main" id="{E4D6A3DD-EB75-43A6-A139-19FEBE74FE3F}"/>
+                <a16:creationId xmlns:a16="http://schemas.microsoft.com/office/drawing/2014/main" id="{0169B8BB-8892-4022-ADAE-4E7946CF2024}"/>
               </a:ext>
             </a:extLst>
           </p:cNvPr>
@@ -4267,7 +4258,7 @@
             </a:pPr>
             <a:r>
               <a:rPr lang="en-US" sz="2400" dirty="0"/>
-              <a:t> Going towards digital transformation of FHNW</a:t>
+              <a:t> Team</a:t>
             </a:r>
           </a:p>
           <a:p>
@@ -4277,14 +4268,45 @@
             </a:pPr>
             <a:r>
               <a:rPr lang="en-US" sz="2400" dirty="0"/>
-              <a:t> Complexity level justifies the use of Agile</a:t>
+              <a:t> Friedrich Witschel</a:t>
             </a:r>
           </a:p>
           <a:p>
             <a:pPr>
-              <a:buFont typeface="Courier New" panose="02070309020205020404" pitchFamily="49" charset="0"/>
-              <a:buChar char="o"/>
+              <a:buFont typeface="Arial" panose="020B0604020202020204" pitchFamily="34" charset="0"/>
+              <a:buChar char="•"/>
             </a:pPr>
+            <a:r>
+              <a:rPr lang="en-US" sz="2400" dirty="0"/>
+              <a:t> Project coach</a:t>
+            </a:r>
+          </a:p>
+          <a:p>
+            <a:pPr marL="0" indent="0">
+              <a:buNone/>
+            </a:pPr>
+            <a:endParaRPr lang="en-US" sz="2400" dirty="0"/>
+          </a:p>
+          <a:p>
+            <a:pPr marL="0" indent="0">
+              <a:buNone/>
+            </a:pPr>
+            <a:endParaRPr lang="en-US" sz="2400" dirty="0"/>
+          </a:p>
+          <a:p>
+            <a:pPr>
+              <a:buFont typeface="Arial" panose="020B0604020202020204" pitchFamily="34" charset="0"/>
+              <a:buChar char="•"/>
+            </a:pPr>
+            <a:r>
+              <a:rPr lang="en-US" sz="2400" dirty="0"/>
+              <a:t> Other? (e.g. students of BI course, external help)</a:t>
+            </a:r>
+          </a:p>
+          <a:p>
+            <a:endParaRPr lang="en-US" dirty="0"/>
+          </a:p>
+          <a:p>
             <a:endParaRPr lang="en-US" dirty="0"/>
           </a:p>
         </p:txBody>
@@ -4292,7 +4314,7 @@
     </p:spTree>
     <p:extLst>
       <p:ext uri="{BB962C8B-B14F-4D97-AF65-F5344CB8AC3E}">
-        <p14:creationId xmlns:p14="http://schemas.microsoft.com/office/powerpoint/2010/main" val="1712342135"/>
+        <p14:creationId xmlns:p14="http://schemas.microsoft.com/office/powerpoint/2010/main" val="280001404"/>
       </p:ext>
     </p:extLst>
   </p:cSld>
@@ -4342,7 +4364,7 @@
           <a:p>
             <a:r>
               <a:rPr lang="en-US" dirty="0"/>
-              <a:t>Is the WHO defined?(Stacey Matrix)</a:t>
+              <a:t>What about the WHAT? (Stacey Matrix)</a:t>
             </a:r>
           </a:p>
         </p:txBody>
@@ -4365,7 +4387,9 @@
         </p:nvSpPr>
         <p:spPr/>
         <p:txBody>
-          <a:bodyPr/>
+          <a:bodyPr>
+            <a:normAutofit/>
+          </a:bodyPr>
           <a:lstStyle/>
           <a:p>
             <a:pPr>
@@ -4374,52 +4398,70 @@
             </a:pPr>
             <a:r>
               <a:rPr lang="en-US" sz="2400" dirty="0"/>
-              <a:t> Team</a:t>
-            </a:r>
-          </a:p>
-          <a:p>
-            <a:pPr>
+              <a:t> A solution …</a:t>
+            </a:r>
+          </a:p>
+          <a:p>
+            <a:pPr lvl="1">
               <a:buFont typeface="Arial" panose="020B0604020202020204" pitchFamily="34" charset="0"/>
               <a:buChar char="•"/>
             </a:pPr>
             <a:r>
-              <a:rPr lang="en-US" sz="2400" dirty="0"/>
-              <a:t> Friedrich Witschel</a:t>
-            </a:r>
-          </a:p>
-          <a:p>
-            <a:pPr>
+              <a:rPr lang="en-US" sz="2000" dirty="0"/>
+              <a:t>… to provide answers to questions related to the Business Intelligence course</a:t>
+            </a:r>
+          </a:p>
+          <a:p>
+            <a:pPr lvl="1">
               <a:buFont typeface="Arial" panose="020B0604020202020204" pitchFamily="34" charset="0"/>
               <a:buChar char="•"/>
             </a:pPr>
             <a:r>
-              <a:rPr lang="en-US" sz="2400" dirty="0"/>
-              <a:t> Project coach</a:t>
-            </a:r>
-          </a:p>
-          <a:p>
-            <a:pPr marL="0" indent="0">
-              <a:buNone/>
-            </a:pPr>
-            <a:endParaRPr lang="en-US" sz="2400" dirty="0"/>
-          </a:p>
-          <a:p>
-            <a:pPr marL="0" indent="0">
-              <a:buNone/>
-            </a:pPr>
-            <a:endParaRPr lang="en-US" sz="2400" dirty="0"/>
-          </a:p>
-          <a:p>
-            <a:pPr>
+              <a:rPr lang="en-US" sz="2000" dirty="0"/>
+              <a:t>…. that allows student to get answers in a quick and efficient way</a:t>
+            </a:r>
+          </a:p>
+          <a:p>
+            <a:pPr lvl="1">
               <a:buFont typeface="Arial" panose="020B0604020202020204" pitchFamily="34" charset="0"/>
               <a:buChar char="•"/>
             </a:pPr>
             <a:r>
-              <a:rPr lang="en-US" sz="2400" dirty="0"/>
-              <a:t> Other? (e.g. students of BI course, external help)</a:t>
-            </a:r>
-          </a:p>
-          <a:p>
+              <a:rPr lang="en-US" sz="2000" dirty="0"/>
+              <a:t>… that is available all the time</a:t>
+            </a:r>
+          </a:p>
+          <a:p>
+            <a:pPr lvl="1">
+              <a:buFont typeface="Arial" panose="020B0604020202020204" pitchFamily="34" charset="0"/>
+              <a:buChar char="•"/>
+            </a:pPr>
+            <a:r>
+              <a:rPr lang="en-US" sz="2000" dirty="0"/>
+              <a:t>… that relieves teachers from having to respond to every single student question</a:t>
+            </a:r>
+          </a:p>
+          <a:p>
+            <a:pPr lvl="1">
+              <a:buFont typeface="Arial" panose="020B0604020202020204" pitchFamily="34" charset="0"/>
+              <a:buChar char="•"/>
+            </a:pPr>
+            <a:r>
+              <a:rPr lang="en-US" sz="2000" dirty="0"/>
+              <a:t>… that is automated so as to permit 24/7 support</a:t>
+            </a:r>
+          </a:p>
+          <a:p>
+            <a:pPr lvl="1">
+              <a:buFont typeface="Arial" panose="020B0604020202020204" pitchFamily="34" charset="0"/>
+              <a:buChar char="•"/>
+            </a:pPr>
+            <a:endParaRPr lang="en-US" sz="2200" dirty="0"/>
+          </a:p>
+          <a:p>
+            <a:pPr marL="0" indent="0">
+              <a:buNone/>
+            </a:pPr>
             <a:endParaRPr lang="en-US" dirty="0"/>
           </a:p>
           <a:p>
@@ -4430,7 +4472,7 @@
     </p:spTree>
     <p:extLst>
       <p:ext uri="{BB962C8B-B14F-4D97-AF65-F5344CB8AC3E}">
-        <p14:creationId xmlns:p14="http://schemas.microsoft.com/office/powerpoint/2010/main" val="280001404"/>
+        <p14:creationId xmlns:p14="http://schemas.microsoft.com/office/powerpoint/2010/main" val="1491622185"/>
       </p:ext>
     </p:extLst>
   </p:cSld>
@@ -4462,7 +4504,7 @@
           <p:cNvPr id="2" name="Titre 1">
             <a:extLst>
               <a:ext uri="{FF2B5EF4-FFF2-40B4-BE49-F238E27FC236}">
-                <a16:creationId xmlns:a16="http://schemas.microsoft.com/office/drawing/2014/main" id="{C0E931EB-78B1-4E31-B709-475371A200FC}"/>
+                <a16:creationId xmlns:a16="http://schemas.microsoft.com/office/drawing/2014/main" id="{3395B0AA-AB13-4E85-BC68-6D6DFC5B2315}"/>
               </a:ext>
             </a:extLst>
           </p:cNvPr>
@@ -4480,7 +4522,7 @@
           <a:p>
             <a:r>
               <a:rPr lang="en-US" dirty="0"/>
-              <a:t>What about the WHAT?(Stacey Matrix)</a:t>
+              <a:t>And HOW? (Stacey Matrix)</a:t>
             </a:r>
           </a:p>
         </p:txBody>
@@ -4490,7 +4532,7 @@
           <p:cNvPr id="3" name="Espace réservé du contenu 2">
             <a:extLst>
               <a:ext uri="{FF2B5EF4-FFF2-40B4-BE49-F238E27FC236}">
-                <a16:creationId xmlns:a16="http://schemas.microsoft.com/office/drawing/2014/main" id="{0169B8BB-8892-4022-ADAE-4E7946CF2024}"/>
+                <a16:creationId xmlns:a16="http://schemas.microsoft.com/office/drawing/2014/main" id="{3FDFDB93-8BAC-49B8-850A-CED7AA496A41}"/>
               </a:ext>
             </a:extLst>
           </p:cNvPr>
@@ -4503,7 +4545,9 @@
         </p:nvSpPr>
         <p:spPr/>
         <p:txBody>
-          <a:bodyPr/>
+          <a:bodyPr>
+            <a:normAutofit/>
+          </a:bodyPr>
           <a:lstStyle/>
           <a:p>
             <a:pPr>
@@ -4512,7 +4556,7 @@
             </a:pPr>
             <a:r>
               <a:rPr lang="en-US" sz="2400" dirty="0"/>
-              <a:t> A tool to provide answer questions related to the Business Intelligence course</a:t>
+              <a:t>… analyze the Question-to-Answer process </a:t>
             </a:r>
           </a:p>
           <a:p>
@@ -4520,7 +4564,10 @@
               <a:buFont typeface="Arial" panose="020B0604020202020204" pitchFamily="34" charset="0"/>
               <a:buChar char="•"/>
             </a:pPr>
-            <a:endParaRPr lang="en-US" sz="2400" dirty="0"/>
+            <a:r>
+              <a:rPr lang="en-US" sz="2400" dirty="0"/>
+              <a:t> … Gather required course related knowledge in Q&amp;A form (documented knowledge)</a:t>
+            </a:r>
           </a:p>
           <a:p>
             <a:pPr>
@@ -4529,7 +4576,7 @@
             </a:pPr>
             <a:r>
               <a:rPr lang="en-US" sz="2400" dirty="0"/>
-              <a:t> For the students</a:t>
+              <a:t> … Translate the Q&amp;A into Natural Language Processing (NLP)</a:t>
             </a:r>
           </a:p>
           <a:p>
@@ -4537,54 +4584,20 @@
               <a:buFont typeface="Arial" panose="020B0604020202020204" pitchFamily="34" charset="0"/>
               <a:buChar char="•"/>
             </a:pPr>
+            <a:r>
+              <a:rPr lang="en-US" sz="2400" dirty="0"/>
+              <a:t>… use a combination of knowledge engineering and Machine learning for correct and self-developing Chatbot solution (The more data the more effective)</a:t>
+            </a:r>
+          </a:p>
+          <a:p>
             <a:endParaRPr lang="en-US" sz="2400" dirty="0"/>
-          </a:p>
-          <a:p>
-            <a:pPr>
-              <a:buFont typeface="Arial" panose="020B0604020202020204" pitchFamily="34" charset="0"/>
-              <a:buChar char="•"/>
-            </a:pPr>
-            <a:r>
-              <a:rPr lang="en-US" sz="2400" dirty="0"/>
-              <a:t> Without having to write an E-mail to Teacher</a:t>
-            </a:r>
-          </a:p>
-          <a:p>
-            <a:pPr>
-              <a:buFont typeface="Arial" panose="020B0604020202020204" pitchFamily="34" charset="0"/>
-              <a:buChar char="•"/>
-            </a:pPr>
-            <a:endParaRPr lang="en-US" sz="2400" dirty="0"/>
-          </a:p>
-          <a:p>
-            <a:pPr>
-              <a:buFont typeface="Arial" panose="020B0604020202020204" pitchFamily="34" charset="0"/>
-              <a:buChar char="•"/>
-            </a:pPr>
-            <a:r>
-              <a:rPr lang="en-US" sz="2400" dirty="0"/>
-              <a:t> Automated (24/7) support</a:t>
-            </a:r>
-            <a:br>
-              <a:rPr lang="en-US" dirty="0"/>
-            </a:br>
-            <a:endParaRPr lang="en-US" dirty="0"/>
-          </a:p>
-          <a:p>
-            <a:pPr marL="0" indent="0">
-              <a:buNone/>
-            </a:pPr>
-            <a:endParaRPr lang="en-US" dirty="0"/>
-          </a:p>
-          <a:p>
-            <a:endParaRPr lang="en-US" dirty="0"/>
           </a:p>
         </p:txBody>
       </p:sp>
     </p:spTree>
     <p:extLst>
       <p:ext uri="{BB962C8B-B14F-4D97-AF65-F5344CB8AC3E}">
-        <p14:creationId xmlns:p14="http://schemas.microsoft.com/office/powerpoint/2010/main" val="1491622185"/>
+        <p14:creationId xmlns:p14="http://schemas.microsoft.com/office/powerpoint/2010/main" val="693620686"/>
       </p:ext>
     </p:extLst>
   </p:cSld>
@@ -4633,220 +4646,12 @@
           <a:lstStyle/>
           <a:p>
             <a:r>
+              <a:rPr lang="en-US" dirty="0" err="1"/>
+              <a:t>Sooo</a:t>
+            </a:r>
+            <a:r>
               <a:rPr lang="en-US" dirty="0"/>
-              <a:t>And HOW?</a:t>
-            </a:r>
-          </a:p>
-        </p:txBody>
-      </p:sp>
-      <p:sp>
-        <p:nvSpPr>
-          <p:cNvPr id="3" name="Espace réservé du contenu 2">
-            <a:extLst>
-              <a:ext uri="{FF2B5EF4-FFF2-40B4-BE49-F238E27FC236}">
-                <a16:creationId xmlns:a16="http://schemas.microsoft.com/office/drawing/2014/main" id="{3FDFDB93-8BAC-49B8-850A-CED7AA496A41}"/>
-              </a:ext>
-            </a:extLst>
-          </p:cNvPr>
-          <p:cNvSpPr>
-            <a:spLocks noGrp="1"/>
-          </p:cNvSpPr>
-          <p:nvPr>
-            <p:ph idx="1"/>
-          </p:nvPr>
-        </p:nvSpPr>
-        <p:spPr/>
-        <p:txBody>
-          <a:bodyPr>
-            <a:normAutofit/>
-          </a:bodyPr>
-          <a:lstStyle/>
-          <a:p>
-            <a:pPr>
-              <a:buFont typeface="Arial" panose="020B0604020202020204" pitchFamily="34" charset="0"/>
-              <a:buChar char="•"/>
-            </a:pPr>
-            <a:r>
-              <a:rPr lang="en-US" sz="2400" dirty="0"/>
-              <a:t> Develop a chatbot?</a:t>
-            </a:r>
-          </a:p>
-          <a:p>
-            <a:pPr>
-              <a:buFont typeface="Arial" panose="020B0604020202020204" pitchFamily="34" charset="0"/>
-              <a:buChar char="•"/>
-            </a:pPr>
-            <a:endParaRPr lang="en-US" sz="2400" dirty="0"/>
-          </a:p>
-          <a:p>
-            <a:pPr>
-              <a:buFont typeface="Arial" panose="020B0604020202020204" pitchFamily="34" charset="0"/>
-              <a:buChar char="•"/>
-            </a:pPr>
-            <a:r>
-              <a:rPr lang="en-US" sz="2400" dirty="0"/>
-              <a:t> Machine learning? Supervised learning?</a:t>
-            </a:r>
-          </a:p>
-          <a:p>
-            <a:pPr>
-              <a:buFont typeface="Arial" panose="020B0604020202020204" pitchFamily="34" charset="0"/>
-              <a:buChar char="•"/>
-            </a:pPr>
-            <a:endParaRPr lang="en-US" sz="2400" dirty="0"/>
-          </a:p>
-          <a:p>
-            <a:pPr>
-              <a:buFont typeface="Arial" panose="020B0604020202020204" pitchFamily="34" charset="0"/>
-              <a:buChar char="•"/>
-            </a:pPr>
-            <a:r>
-              <a:rPr lang="en-US" sz="2400" dirty="0"/>
-              <a:t> Knowledge engineering?</a:t>
-            </a:r>
-          </a:p>
-        </p:txBody>
-      </p:sp>
-    </p:spTree>
-    <p:extLst>
-      <p:ext uri="{BB962C8B-B14F-4D97-AF65-F5344CB8AC3E}">
-        <p14:creationId xmlns:p14="http://schemas.microsoft.com/office/powerpoint/2010/main" val="693620686"/>
-      </p:ext>
-    </p:extLst>
-  </p:cSld>
-  <p:clrMapOvr>
-    <a:masterClrMapping/>
-  </p:clrMapOvr>
-</p:sld>
-</file>
-
-<file path=ppt/slides/slide8.xml><?xml version="1.0" encoding="utf-8"?>
-<p:sld xmlns:a="http://schemas.openxmlformats.org/drawingml/2006/main" xmlns:r="http://schemas.openxmlformats.org/officeDocument/2006/relationships" xmlns:p="http://schemas.openxmlformats.org/presentationml/2006/main">
-  <p:cSld>
-    <p:spTree>
-      <p:nvGrpSpPr>
-        <p:cNvPr id="1" name=""/>
-        <p:cNvGrpSpPr/>
-        <p:nvPr/>
-      </p:nvGrpSpPr>
-      <p:grpSpPr>
-        <a:xfrm>
-          <a:off x="0" y="0"/>
-          <a:ext cx="0" cy="0"/>
-          <a:chOff x="0" y="0"/>
-          <a:chExt cx="0" cy="0"/>
-        </a:xfrm>
-      </p:grpSpPr>
-      <p:sp>
-        <p:nvSpPr>
-          <p:cNvPr id="2" name="Titre 1">
-            <a:extLst>
-              <a:ext uri="{FF2B5EF4-FFF2-40B4-BE49-F238E27FC236}">
-                <a16:creationId xmlns:a16="http://schemas.microsoft.com/office/drawing/2014/main" id="{3395B0AA-AB13-4E85-BC68-6D6DFC5B2315}"/>
-              </a:ext>
-            </a:extLst>
-          </p:cNvPr>
-          <p:cNvSpPr>
-            <a:spLocks noGrp="1"/>
-          </p:cNvSpPr>
-          <p:nvPr>
-            <p:ph type="title"/>
-          </p:nvPr>
-        </p:nvSpPr>
-        <p:spPr/>
-        <p:txBody>
-          <a:bodyPr/>
-          <a:lstStyle/>
-          <a:p>
-            <a:r>
-              <a:rPr lang="en-US" dirty="0" err="1">
-                <a:solidFill>
-                  <a:schemeClr val="tx1"/>
-                </a:solidFill>
-              </a:rPr>
-              <a:t>Sooo</a:t>
-            </a:r>
-            <a:r>
-              <a:rPr lang="en-US" dirty="0">
-                <a:solidFill>
-                  <a:schemeClr val="tx1"/>
-                </a:solidFill>
-              </a:rPr>
-              <a:t>? Where are we?</a:t>
-            </a:r>
-            <a:endParaRPr lang="en-US" dirty="0"/>
-          </a:p>
-        </p:txBody>
-      </p:sp>
-      <p:sp>
-        <p:nvSpPr>
-          <p:cNvPr id="3" name="Espace réservé du contenu 2">
-            <a:extLst>
-              <a:ext uri="{FF2B5EF4-FFF2-40B4-BE49-F238E27FC236}">
-                <a16:creationId xmlns:a16="http://schemas.microsoft.com/office/drawing/2014/main" id="{3FDFDB93-8BAC-49B8-850A-CED7AA496A41}"/>
-              </a:ext>
-            </a:extLst>
-          </p:cNvPr>
-          <p:cNvSpPr>
-            <a:spLocks noGrp="1"/>
-          </p:cNvSpPr>
-          <p:nvPr>
-            <p:ph idx="1"/>
-          </p:nvPr>
-        </p:nvSpPr>
-        <p:spPr>
-          <a:xfrm>
-            <a:off x="1097280" y="1845734"/>
-            <a:ext cx="5212081" cy="4023360"/>
-          </a:xfrm>
-        </p:spPr>
-        <p:txBody>
-          <a:bodyPr>
-            <a:normAutofit/>
-          </a:bodyPr>
-          <a:lstStyle/>
-          <a:p>
-            <a:pPr>
-              <a:buFont typeface="Arial" panose="020B0604020202020204" pitchFamily="34" charset="0"/>
-              <a:buChar char="•"/>
-            </a:pPr>
-            <a:r>
-              <a:rPr lang="en-US" sz="2400" dirty="0"/>
-              <a:t> Develop a chatbot?</a:t>
-            </a:r>
-          </a:p>
-          <a:p>
-            <a:pPr>
-              <a:buFont typeface="Arial" panose="020B0604020202020204" pitchFamily="34" charset="0"/>
-              <a:buChar char="•"/>
-            </a:pPr>
-            <a:endParaRPr lang="en-US" sz="2400" dirty="0"/>
-          </a:p>
-          <a:p>
-            <a:pPr>
-              <a:buFont typeface="Arial" panose="020B0604020202020204" pitchFamily="34" charset="0"/>
-              <a:buChar char="•"/>
-            </a:pPr>
-            <a:r>
-              <a:rPr lang="en-US" sz="2400" dirty="0"/>
-              <a:t> Machine learning? Supervised learning?</a:t>
-            </a:r>
-          </a:p>
-          <a:p>
-            <a:pPr>
-              <a:buFont typeface="Arial" panose="020B0604020202020204" pitchFamily="34" charset="0"/>
-              <a:buChar char="•"/>
-            </a:pPr>
-            <a:endParaRPr lang="en-US" sz="2400" dirty="0"/>
-          </a:p>
-          <a:p>
-            <a:pPr>
-              <a:buFont typeface="Arial" panose="020B0604020202020204" pitchFamily="34" charset="0"/>
-              <a:buChar char="•"/>
-            </a:pPr>
-            <a:r>
-              <a:rPr lang="en-US" sz="2400" dirty="0"/>
-              <a:t> Knowledge engineering?</a:t>
+              <a:t>? Where are we? (Stacey Matrix)</a:t>
             </a:r>
           </a:p>
         </p:txBody>
@@ -4879,7 +4684,7 @@
         </p:blipFill>
         <p:spPr>
           <a:xfrm>
-            <a:off x="6309361" y="1845734"/>
+            <a:off x="3418892" y="1845734"/>
             <a:ext cx="5354216" cy="4243215"/>
           </a:xfrm>
           <a:prstGeom prst="rect">
@@ -4900,9 +4705,9 @@
           <p:nvPr/>
         </p:nvSpPr>
         <p:spPr>
-          <a:xfrm rot="3039087">
-            <a:off x="7643369" y="3500344"/>
-            <a:ext cx="2685046" cy="715002"/>
+          <a:xfrm rot="3060000">
+            <a:off x="4894678" y="3265949"/>
+            <a:ext cx="3360687" cy="1321111"/>
           </a:xfrm>
           <a:custGeom>
             <a:avLst/>
@@ -5047,6 +4852,62 @@
               <a:gd name="connsiteY5" fmla="*/ 19631 h 19849"/>
               <a:gd name="connsiteX6" fmla="*/ 9078 w 40695"/>
               <a:gd name="connsiteY6" fmla="*/ 3178 h 19849"/>
+              <a:gd name="connsiteX0" fmla="*/ 9078 w 48671"/>
+              <a:gd name="connsiteY0" fmla="*/ 15911 h 32582"/>
+              <a:gd name="connsiteX1" fmla="*/ 48268 w 48671"/>
+              <a:gd name="connsiteY1" fmla="*/ 0 h 32582"/>
+              <a:gd name="connsiteX2" fmla="*/ 40627 w 48671"/>
+              <a:gd name="connsiteY2" fmla="*/ 26007 h 32582"/>
+              <a:gd name="connsiteX3" fmla="*/ 22862 w 48671"/>
+              <a:gd name="connsiteY3" fmla="*/ 25788 h 32582"/>
+              <a:gd name="connsiteX4" fmla="*/ 13163 w 48671"/>
+              <a:gd name="connsiteY4" fmla="*/ 25797 h 32582"/>
+              <a:gd name="connsiteX5" fmla="*/ 41 w 48671"/>
+              <a:gd name="connsiteY5" fmla="*/ 32364 h 32582"/>
+              <a:gd name="connsiteX6" fmla="*/ 9078 w 48671"/>
+              <a:gd name="connsiteY6" fmla="*/ 15911 h 32582"/>
+              <a:gd name="connsiteX0" fmla="*/ 9078 w 50100"/>
+              <a:gd name="connsiteY0" fmla="*/ 15911 h 32582"/>
+              <a:gd name="connsiteX1" fmla="*/ 48268 w 50100"/>
+              <a:gd name="connsiteY1" fmla="*/ 0 h 32582"/>
+              <a:gd name="connsiteX2" fmla="*/ 47314 w 50100"/>
+              <a:gd name="connsiteY2" fmla="*/ 21628 h 32582"/>
+              <a:gd name="connsiteX3" fmla="*/ 22862 w 50100"/>
+              <a:gd name="connsiteY3" fmla="*/ 25788 h 32582"/>
+              <a:gd name="connsiteX4" fmla="*/ 13163 w 50100"/>
+              <a:gd name="connsiteY4" fmla="*/ 25797 h 32582"/>
+              <a:gd name="connsiteX5" fmla="*/ 41 w 50100"/>
+              <a:gd name="connsiteY5" fmla="*/ 32364 h 32582"/>
+              <a:gd name="connsiteX6" fmla="*/ 9078 w 50100"/>
+              <a:gd name="connsiteY6" fmla="*/ 15911 h 32582"/>
+              <a:gd name="connsiteX0" fmla="*/ 9078 w 55625"/>
+              <a:gd name="connsiteY0" fmla="*/ 19504 h 36175"/>
+              <a:gd name="connsiteX1" fmla="*/ 55167 w 55625"/>
+              <a:gd name="connsiteY1" fmla="*/ 0 h 36175"/>
+              <a:gd name="connsiteX2" fmla="*/ 47314 w 55625"/>
+              <a:gd name="connsiteY2" fmla="*/ 25221 h 36175"/>
+              <a:gd name="connsiteX3" fmla="*/ 22862 w 55625"/>
+              <a:gd name="connsiteY3" fmla="*/ 29381 h 36175"/>
+              <a:gd name="connsiteX4" fmla="*/ 13163 w 55625"/>
+              <a:gd name="connsiteY4" fmla="*/ 29390 h 36175"/>
+              <a:gd name="connsiteX5" fmla="*/ 41 w 55625"/>
+              <a:gd name="connsiteY5" fmla="*/ 35957 h 36175"/>
+              <a:gd name="connsiteX6" fmla="*/ 9078 w 55625"/>
+              <a:gd name="connsiteY6" fmla="*/ 19504 h 36175"/>
+              <a:gd name="connsiteX0" fmla="*/ 9078 w 55625"/>
+              <a:gd name="connsiteY0" fmla="*/ 19504 h 36175"/>
+              <a:gd name="connsiteX1" fmla="*/ 55167 w 55625"/>
+              <a:gd name="connsiteY1" fmla="*/ 0 h 36175"/>
+              <a:gd name="connsiteX2" fmla="*/ 47314 w 55625"/>
+              <a:gd name="connsiteY2" fmla="*/ 25221 h 36175"/>
+              <a:gd name="connsiteX3" fmla="*/ 22862 w 55625"/>
+              <a:gd name="connsiteY3" fmla="*/ 29381 h 36175"/>
+              <a:gd name="connsiteX4" fmla="*/ 13163 w 55625"/>
+              <a:gd name="connsiteY4" fmla="*/ 29390 h 36175"/>
+              <a:gd name="connsiteX5" fmla="*/ 41 w 55625"/>
+              <a:gd name="connsiteY5" fmla="*/ 35957 h 36175"/>
+              <a:gd name="connsiteX6" fmla="*/ 9078 w 55625"/>
+              <a:gd name="connsiteY6" fmla="*/ 19504 h 36175"/>
             </a:gdLst>
             <a:ahLst/>
             <a:cxnLst>
@@ -5074,35 +4935,37 @@
             </a:cxnLst>
             <a:rect l="l" t="t" r="r" b="b"/>
             <a:pathLst>
-              <a:path w="40695" h="19849">
+              <a:path w="55625" h="36175">
                 <a:moveTo>
-                  <a:pt x="9078" y="3178"/>
+                  <a:pt x="9078" y="19504"/>
                 </a:moveTo>
+                <a:cubicBezTo>
+                  <a:pt x="15722" y="18445"/>
+                  <a:pt x="43831" y="11133"/>
+                  <a:pt x="55167" y="0"/>
+                </a:cubicBezTo>
+                <a:cubicBezTo>
+                  <a:pt x="57086" y="0"/>
+                  <a:pt x="52698" y="20324"/>
+                  <a:pt x="47314" y="25221"/>
+                </a:cubicBezTo>
+                <a:cubicBezTo>
+                  <a:pt x="41930" y="30118"/>
+                  <a:pt x="24781" y="29381"/>
+                  <a:pt x="22862" y="29381"/>
+                </a:cubicBezTo>
                 <a:lnTo>
-                  <a:pt x="29010" y="0"/>
+                  <a:pt x="13163" y="29390"/>
                 </a:lnTo>
                 <a:cubicBezTo>
-                  <a:pt x="30929" y="0"/>
-                  <a:pt x="41652" y="11098"/>
-                  <a:pt x="40627" y="13274"/>
+                  <a:pt x="11244" y="29390"/>
+                  <a:pt x="722" y="37605"/>
+                  <a:pt x="41" y="35957"/>
                 </a:cubicBezTo>
                 <a:cubicBezTo>
-                  <a:pt x="39602" y="15450"/>
-                  <a:pt x="24781" y="13055"/>
-                  <a:pt x="22862" y="13055"/>
-                </a:cubicBezTo>
-                <a:lnTo>
-                  <a:pt x="13163" y="13064"/>
-                </a:lnTo>
-                <a:cubicBezTo>
-                  <a:pt x="11244" y="13064"/>
-                  <a:pt x="722" y="21279"/>
-                  <a:pt x="41" y="19631"/>
-                </a:cubicBezTo>
-                <a:cubicBezTo>
-                  <a:pt x="-640" y="17983"/>
-                  <a:pt x="7159" y="3178"/>
-                  <a:pt x="9078" y="3178"/>
+                  <a:pt x="-640" y="34309"/>
+                  <a:pt x="7159" y="19504"/>
+                  <a:pt x="9078" y="19504"/>
                 </a:cubicBezTo>
                 <a:close/>
               </a:path>
@@ -5135,7 +4998,7 @@
             <a:pPr algn="ctr"/>
             <a:r>
               <a:rPr lang="en-US" dirty="0"/>
-              <a:t>Somewhere here</a:t>
+              <a:t>                    Somewhere here</a:t>
             </a:r>
           </a:p>
         </p:txBody>
@@ -5231,6 +5094,140 @@
 </p:sld>
 </file>
 
+<file path=ppt/slides/slide8.xml><?xml version="1.0" encoding="utf-8"?>
+<p:sld xmlns:a="http://schemas.openxmlformats.org/drawingml/2006/main" xmlns:r="http://schemas.openxmlformats.org/officeDocument/2006/relationships" xmlns:p="http://schemas.openxmlformats.org/presentationml/2006/main">
+  <p:cSld>
+    <p:spTree>
+      <p:nvGrpSpPr>
+        <p:cNvPr id="1" name=""/>
+        <p:cNvGrpSpPr/>
+        <p:nvPr/>
+      </p:nvGrpSpPr>
+      <p:grpSpPr>
+        <a:xfrm>
+          <a:off x="0" y="0"/>
+          <a:ext cx="0" cy="0"/>
+          <a:chOff x="0" y="0"/>
+          <a:chExt cx="0" cy="0"/>
+        </a:xfrm>
+      </p:grpSpPr>
+      <p:sp>
+        <p:nvSpPr>
+          <p:cNvPr id="2" name="Titre 1">
+            <a:extLst>
+              <a:ext uri="{FF2B5EF4-FFF2-40B4-BE49-F238E27FC236}">
+                <a16:creationId xmlns:a16="http://schemas.microsoft.com/office/drawing/2014/main" id="{A9083182-92A6-4918-96FD-DAF2712DFADD}"/>
+              </a:ext>
+            </a:extLst>
+          </p:cNvPr>
+          <p:cNvSpPr>
+            <a:spLocks noGrp="1"/>
+          </p:cNvSpPr>
+          <p:nvPr>
+            <p:ph type="title"/>
+          </p:nvPr>
+        </p:nvSpPr>
+        <p:spPr/>
+        <p:txBody>
+          <a:bodyPr/>
+          <a:lstStyle/>
+          <a:p>
+            <a:r>
+              <a:rPr lang="en-US" dirty="0"/>
+              <a:t>What is the situation? Why is a solution needed?</a:t>
+            </a:r>
+          </a:p>
+        </p:txBody>
+      </p:sp>
+      <p:sp>
+        <p:nvSpPr>
+          <p:cNvPr id="3" name="Espace réservé du contenu 2">
+            <a:extLst>
+              <a:ext uri="{FF2B5EF4-FFF2-40B4-BE49-F238E27FC236}">
+                <a16:creationId xmlns:a16="http://schemas.microsoft.com/office/drawing/2014/main" id="{2E80841F-F189-452F-8E64-527B228B49B7}"/>
+              </a:ext>
+            </a:extLst>
+          </p:cNvPr>
+          <p:cNvSpPr>
+            <a:spLocks noGrp="1"/>
+          </p:cNvSpPr>
+          <p:nvPr>
+            <p:ph idx="1"/>
+          </p:nvPr>
+        </p:nvSpPr>
+        <p:spPr/>
+        <p:txBody>
+          <a:bodyPr/>
+          <a:lstStyle/>
+          <a:p>
+            <a:pPr>
+              <a:buFont typeface="Arial" panose="020B0604020202020204" pitchFamily="34" charset="0"/>
+              <a:buChar char="•"/>
+            </a:pPr>
+            <a:r>
+              <a:rPr lang="en-US" dirty="0"/>
+              <a:t> </a:t>
+            </a:r>
+            <a:r>
+              <a:rPr lang="en-US" sz="2400" dirty="0"/>
+              <a:t>Currently there are no chatbot solution that the students can use to get answers to their questions in a quick and effective manner</a:t>
+            </a:r>
+          </a:p>
+          <a:p>
+            <a:pPr>
+              <a:buFont typeface="Arial" panose="020B0604020202020204" pitchFamily="34" charset="0"/>
+              <a:buChar char="•"/>
+            </a:pPr>
+            <a:r>
+              <a:rPr lang="en-US" sz="2400" dirty="0"/>
+              <a:t>The teacher (already quite busy because he’s a teacher) needs to take additional time to try and answer every question he receives from his students.  </a:t>
+            </a:r>
+          </a:p>
+          <a:p>
+            <a:pPr>
+              <a:buFont typeface="Arial" panose="020B0604020202020204" pitchFamily="34" charset="0"/>
+              <a:buChar char="•"/>
+            </a:pPr>
+            <a:r>
+              <a:rPr lang="en-US" sz="2400" dirty="0"/>
+              <a:t>As the teacher is usually unable, due to time constraints, to answer every student question and with the same amount of dedication, a quite unfair situation is the result:</a:t>
+            </a:r>
+          </a:p>
+          <a:p>
+            <a:pPr lvl="1">
+              <a:buFont typeface="Arial" panose="020B0604020202020204" pitchFamily="34" charset="0"/>
+              <a:buChar char="•"/>
+            </a:pPr>
+            <a:r>
+              <a:rPr lang="en-US" sz="2200" dirty="0"/>
+              <a:t>Some students get answered and other not (plus, varying quality of answers)</a:t>
+            </a:r>
+          </a:p>
+          <a:p>
+            <a:pPr lvl="1">
+              <a:buFont typeface="Arial" panose="020B0604020202020204" pitchFamily="34" charset="0"/>
+              <a:buChar char="•"/>
+            </a:pPr>
+            <a:r>
+              <a:rPr lang="en-US" sz="2200" dirty="0"/>
+              <a:t>The teacher (who is the one giving grades, is already aware of some students’ weaknesses)</a:t>
+            </a:r>
+          </a:p>
+        </p:txBody>
+      </p:sp>
+    </p:spTree>
+    <p:extLst>
+      <p:ext uri="{BB962C8B-B14F-4D97-AF65-F5344CB8AC3E}">
+        <p14:creationId xmlns:p14="http://schemas.microsoft.com/office/powerpoint/2010/main" val="2606228842"/>
+      </p:ext>
+    </p:extLst>
+  </p:cSld>
+  <p:clrMapOvr>
+    <a:masterClrMapping/>
+  </p:clrMapOvr>
+</p:sld>
+</file>
+
 <file path=ppt/slides/slide9.xml><?xml version="1.0" encoding="utf-8"?>
 <p:sld xmlns:a="http://schemas.openxmlformats.org/drawingml/2006/main" xmlns:r="http://schemas.openxmlformats.org/officeDocument/2006/relationships" xmlns:p="http://schemas.openxmlformats.org/presentationml/2006/main">
   <p:cSld>
@@ -5253,7 +5250,7 @@
           <p:cNvPr id="2" name="Titre 1">
             <a:extLst>
               <a:ext uri="{FF2B5EF4-FFF2-40B4-BE49-F238E27FC236}">
-                <a16:creationId xmlns:a16="http://schemas.microsoft.com/office/drawing/2014/main" id="{A9083182-92A6-4918-96FD-DAF2712DFADD}"/>
+                <a16:creationId xmlns:a16="http://schemas.microsoft.com/office/drawing/2014/main" id="{46430754-1CFB-48F0-8057-FA31C9D16A9E}"/>
               </a:ext>
             </a:extLst>
           </p:cNvPr>
@@ -5271,7 +5268,7 @@
           <a:p>
             <a:r>
               <a:rPr lang="en-US" dirty="0"/>
-              <a:t>What is the situation?</a:t>
+              <a:t>What are our expectations?</a:t>
             </a:r>
           </a:p>
         </p:txBody>
@@ -5281,7 +5278,7 @@
           <p:cNvPr id="3" name="Espace réservé du contenu 2">
             <a:extLst>
               <a:ext uri="{FF2B5EF4-FFF2-40B4-BE49-F238E27FC236}">
-                <a16:creationId xmlns:a16="http://schemas.microsoft.com/office/drawing/2014/main" id="{2E80841F-F189-452F-8E64-527B228B49B7}"/>
+                <a16:creationId xmlns:a16="http://schemas.microsoft.com/office/drawing/2014/main" id="{2E1EFBB3-4F70-45C5-91CA-432478C5F27E}"/>
               </a:ext>
             </a:extLst>
           </p:cNvPr>
@@ -5294,17 +5291,56 @@
         </p:nvSpPr>
         <p:spPr/>
         <p:txBody>
-          <a:bodyPr/>
-          <a:lstStyle/>
-          <a:p>
-            <a:endParaRPr lang="en-US"/>
+          <a:bodyPr>
+            <a:normAutofit/>
+          </a:bodyPr>
+          <a:lstStyle/>
+          <a:p>
+            <a:pPr>
+              <a:buFont typeface="Arial" panose="020B0604020202020204" pitchFamily="34" charset="0"/>
+              <a:buChar char="•"/>
+            </a:pPr>
+            <a:r>
+              <a:rPr lang="en-US" sz="2400" dirty="0"/>
+              <a:t>Experiment on the possibility to convert tacit knowledge into automated knowledge</a:t>
+            </a:r>
+          </a:p>
+          <a:p>
+            <a:pPr>
+              <a:buFont typeface="Arial" panose="020B0604020202020204" pitchFamily="34" charset="0"/>
+              <a:buChar char="•"/>
+            </a:pPr>
+            <a:r>
+              <a:rPr lang="en-US" sz="2400" dirty="0"/>
+              <a:t>Experiment on machine learning using the large amount of data available (collection of E-Mail exchanges between Students and Fredrich)</a:t>
+            </a:r>
+          </a:p>
+          <a:p>
+            <a:pPr>
+              <a:buFont typeface="Arial" panose="020B0604020202020204" pitchFamily="34" charset="0"/>
+              <a:buChar char="•"/>
+            </a:pPr>
+            <a:r>
+              <a:rPr lang="en-US" sz="2400" dirty="0"/>
+              <a:t>Develop an MVP (for lack of a better word) for a chatbot solution</a:t>
+            </a:r>
+          </a:p>
+          <a:p>
+            <a:pPr>
+              <a:buFont typeface="Arial" panose="020B0604020202020204" pitchFamily="34" charset="0"/>
+              <a:buChar char="•"/>
+            </a:pPr>
+            <a:r>
+              <a:rPr lang="en-US" sz="2400" dirty="0"/>
+              <a:t>Integrate this chatbot solution</a:t>
+            </a:r>
           </a:p>
         </p:txBody>
       </p:sp>
     </p:spTree>
     <p:extLst>
       <p:ext uri="{BB962C8B-B14F-4D97-AF65-F5344CB8AC3E}">
-        <p14:creationId xmlns:p14="http://schemas.microsoft.com/office/powerpoint/2010/main" val="2606228842"/>
+        <p14:creationId xmlns:p14="http://schemas.microsoft.com/office/powerpoint/2010/main" val="2142257506"/>
       </p:ext>
     </p:extLst>
   </p:cSld>

</xml_diff>